<commit_message>
tests: upper cased names
</commit_message>
<xml_diff>
--- a/tests/NameBadgeAutomater.Tests/TestFiles/OneTemplateTwice.pptx
+++ b/tests/NameBadgeAutomater.Tests/TestFiles/OneTemplateTwice.pptx
@@ -277,7 +277,7 @@
               <a:pPr>
                 <a:defRPr/>
               </a:pPr>
-              <a:t>10/31/2022</a:t>
+              <a:t>11/17/2022</a:t>
             </a:fld>
             <a:endParaRPr lang="en-US"/>
           </a:p>
@@ -4979,15 +4979,6 @@
 </file>
 
 <file path=customXml/item1.xml><?xml version="1.0" encoding="utf-8"?>
-<?mso-contentType ?>
-<FormTemplates xmlns="http://schemas.microsoft.com/sharepoint/v3/contenttype/forms">
-  <Display>DocumentLibraryForm</Display>
-  <Edit>DocumentLibraryForm</Edit>
-  <New>DocumentLibraryForm</New>
-</FormTemplates>
-</file>
-
-<file path=customXml/item2.xml><?xml version="1.0" encoding="utf-8"?>
 <ct:contentTypeSchema xmlns:ct="http://schemas.microsoft.com/office/2006/metadata/contentType" xmlns:ma="http://schemas.microsoft.com/office/2006/metadata/properties/metaAttributes" ct:_="" ma:_="" ma:contentTypeName="Document" ma:contentTypeID="0x0101000EC8333B853F30479CABBE7B1BB16796" ma:contentTypeVersion="16" ma:contentTypeDescription="Create a new document." ma:contentTypeScope="" ma:versionID="79d1ce0380bcab53ce61ebaea46b63bc">
   <xsd:schema xmlns:xsd="http://www.w3.org/2001/XMLSchema" xmlns:xs="http://www.w3.org/2001/XMLSchema" xmlns:p="http://schemas.microsoft.com/office/2006/metadata/properties" xmlns:ns2="402a5a46-9a97-448a-b393-b3c8becf2e0d" xmlns:ns3="973854e3-2084-40dd-954e-e014d59ac262" targetNamespace="http://schemas.microsoft.com/office/2006/metadata/properties" ma:root="true" ma:fieldsID="509bd81dcd7e2770616e68a83402dc3e" ns2:_="" ns3:_="">
     <xsd:import namespace="402a5a46-9a97-448a-b393-b3c8becf2e0d"/>
@@ -5230,6 +5221,15 @@
 </ct:contentTypeSchema>
 </file>
 
+<file path=customXml/item2.xml><?xml version="1.0" encoding="utf-8"?>
+<?mso-contentType ?>
+<FormTemplates xmlns="http://schemas.microsoft.com/sharepoint/v3/contenttype/forms">
+  <Display>DocumentLibraryForm</Display>
+  <Edit>DocumentLibraryForm</Edit>
+  <New>DocumentLibraryForm</New>
+</FormTemplates>
+</file>
+
 <file path=customXml/item3.xml><?xml version="1.0" encoding="utf-8"?>
 <p:properties xmlns:p="http://schemas.microsoft.com/office/2006/metadata/properties" xmlns:xsi="http://www.w3.org/2001/XMLSchema-instance" xmlns:pc="http://schemas.microsoft.com/office/infopath/2007/PartnerControls">
   <documentManagement>
@@ -5249,14 +5249,6 @@
 </file>
 
 <file path=customXml/itemProps1.xml><?xml version="1.0" encoding="utf-8"?>
-<ds:datastoreItem xmlns:ds="http://schemas.openxmlformats.org/officeDocument/2006/customXml" ds:itemID="{6BA213A8-057F-464C-BA08-5D2A082533F1}">
-  <ds:schemaRefs>
-    <ds:schemaRef ds:uri="http://schemas.microsoft.com/sharepoint/v3/contenttype/forms"/>
-  </ds:schemaRefs>
-</ds:datastoreItem>
-</file>
-
-<file path=customXml/itemProps2.xml><?xml version="1.0" encoding="utf-8"?>
 <ds:datastoreItem xmlns:ds="http://schemas.openxmlformats.org/officeDocument/2006/customXml" ds:itemID="{96F46DC8-B04C-4C5B-A2AC-A7810EDFFF17}">
   <ds:schemaRefs>
     <ds:schemaRef ds:uri="http://schemas.microsoft.com/office/2006/metadata/contentType"/>
@@ -5271,6 +5263,14 @@
     <ds:schemaRef ds:uri="http://purl.org/dc/elements/1.1/"/>
     <ds:schemaRef ds:uri="http://purl.org/dc/terms/"/>
     <ds:schemaRef ds:uri="http://schemas.microsoft.com/internal/obd"/>
+  </ds:schemaRefs>
+</ds:datastoreItem>
+</file>
+
+<file path=customXml/itemProps2.xml><?xml version="1.0" encoding="utf-8"?>
+<ds:datastoreItem xmlns:ds="http://schemas.openxmlformats.org/officeDocument/2006/customXml" ds:itemID="{6BA213A8-057F-464C-BA08-5D2A082533F1}">
+  <ds:schemaRefs>
+    <ds:schemaRef ds:uri="http://schemas.microsoft.com/sharepoint/v3/contenttype/forms"/>
   </ds:schemaRefs>
 </ds:datastoreItem>
 </file>

</xml_diff>